<commit_message>
Working with files for revision
</commit_message>
<xml_diff>
--- a/instructors/09-working-with-files_v3.0.pptx
+++ b/instructors/09-working-with-files_v3.0.pptx
@@ -5,7 +5,7 @@
     <p:sldMasterId id="2147483648" r:id="rId1"/>
   </p:sldMasterIdLst>
   <p:notesMasterIdLst>
-    <p:notesMasterId r:id="rId27"/>
+    <p:notesMasterId r:id="rId28"/>
   </p:notesMasterIdLst>
   <p:sldIdLst>
     <p:sldId id="280" r:id="rId2"/>
@@ -33,6 +33,7 @@
     <p:sldId id="272" r:id="rId24"/>
     <p:sldId id="291" r:id="rId25"/>
     <p:sldId id="258" r:id="rId26"/>
+    <p:sldId id="296" r:id="rId27"/>
   </p:sldIdLst>
   <p:sldSz cx="12192000" cy="6858000"/>
   <p:notesSz cx="6858000" cy="9144000"/>
@@ -221,7 +222,7 @@
           <a:p>
             <a:fld id="{585C48AE-4A1E-9A43-835F-510354165F99}" type="datetimeFigureOut">
               <a:rPr lang="en-GB" smtClean="0"/>
-              <a:t>16/02/2022</a:t>
+              <a:t>17/01/2023</a:t>
             </a:fld>
             <a:endParaRPr lang="en-GB"/>
           </a:p>
@@ -2352,7 +2353,7 @@
           <a:p>
             <a:fld id="{5913FB77-D8DB-4AB9-8EA5-EE8C3B57A5E1}" type="datetimeFigureOut">
               <a:rPr lang="en-GB" smtClean="0"/>
-              <a:t>16/02/2022</a:t>
+              <a:t>17/01/2023</a:t>
             </a:fld>
             <a:endParaRPr lang="en-GB"/>
           </a:p>
@@ -2599,7 +2600,7 @@
           <a:p>
             <a:fld id="{5913FB77-D8DB-4AB9-8EA5-EE8C3B57A5E1}" type="datetimeFigureOut">
               <a:rPr lang="en-GB" smtClean="0"/>
-              <a:t>16/02/2022</a:t>
+              <a:t>17/01/2023</a:t>
             </a:fld>
             <a:endParaRPr lang="en-GB"/>
           </a:p>
@@ -2809,7 +2810,7 @@
           <a:p>
             <a:fld id="{5913FB77-D8DB-4AB9-8EA5-EE8C3B57A5E1}" type="datetimeFigureOut">
               <a:rPr lang="en-GB" smtClean="0"/>
-              <a:t>16/02/2022</a:t>
+              <a:t>17/01/2023</a:t>
             </a:fld>
             <a:endParaRPr lang="en-GB"/>
           </a:p>
@@ -3009,7 +3010,7 @@
           <a:p>
             <a:fld id="{5913FB77-D8DB-4AB9-8EA5-EE8C3B57A5E1}" type="datetimeFigureOut">
               <a:rPr lang="en-GB" smtClean="0"/>
-              <a:t>16/02/2022</a:t>
+              <a:t>17/01/2023</a:t>
             </a:fld>
             <a:endParaRPr lang="en-GB"/>
           </a:p>
@@ -3285,7 +3286,7 @@
           <a:p>
             <a:fld id="{5913FB77-D8DB-4AB9-8EA5-EE8C3B57A5E1}" type="datetimeFigureOut">
               <a:rPr lang="en-GB" smtClean="0"/>
-              <a:t>16/02/2022</a:t>
+              <a:t>17/01/2023</a:t>
             </a:fld>
             <a:endParaRPr lang="en-GB"/>
           </a:p>
@@ -3553,7 +3554,7 @@
           <a:p>
             <a:fld id="{5913FB77-D8DB-4AB9-8EA5-EE8C3B57A5E1}" type="datetimeFigureOut">
               <a:rPr lang="en-GB" smtClean="0"/>
-              <a:t>16/02/2022</a:t>
+              <a:t>17/01/2023</a:t>
             </a:fld>
             <a:endParaRPr lang="en-GB"/>
           </a:p>
@@ -3968,7 +3969,7 @@
           <a:p>
             <a:fld id="{5913FB77-D8DB-4AB9-8EA5-EE8C3B57A5E1}" type="datetimeFigureOut">
               <a:rPr lang="en-GB" smtClean="0"/>
-              <a:t>16/02/2022</a:t>
+              <a:t>17/01/2023</a:t>
             </a:fld>
             <a:endParaRPr lang="en-GB"/>
           </a:p>
@@ -4110,7 +4111,7 @@
           <a:p>
             <a:fld id="{5913FB77-D8DB-4AB9-8EA5-EE8C3B57A5E1}" type="datetimeFigureOut">
               <a:rPr lang="en-GB" smtClean="0"/>
-              <a:t>16/02/2022</a:t>
+              <a:t>17/01/2023</a:t>
             </a:fld>
             <a:endParaRPr lang="en-GB"/>
           </a:p>
@@ -4223,7 +4224,7 @@
           <a:p>
             <a:fld id="{5913FB77-D8DB-4AB9-8EA5-EE8C3B57A5E1}" type="datetimeFigureOut">
               <a:rPr lang="en-GB" smtClean="0"/>
-              <a:t>16/02/2022</a:t>
+              <a:t>17/01/2023</a:t>
             </a:fld>
             <a:endParaRPr lang="en-GB"/>
           </a:p>
@@ -4536,7 +4537,7 @@
           <a:p>
             <a:fld id="{5913FB77-D8DB-4AB9-8EA5-EE8C3B57A5E1}" type="datetimeFigureOut">
               <a:rPr lang="en-GB" smtClean="0"/>
-              <a:t>16/02/2022</a:t>
+              <a:t>17/01/2023</a:t>
             </a:fld>
             <a:endParaRPr lang="en-GB"/>
           </a:p>
@@ -4825,7 +4826,7 @@
           <a:p>
             <a:fld id="{5913FB77-D8DB-4AB9-8EA5-EE8C3B57A5E1}" type="datetimeFigureOut">
               <a:rPr lang="en-GB" smtClean="0"/>
-              <a:t>16/02/2022</a:t>
+              <a:t>17/01/2023</a:t>
             </a:fld>
             <a:endParaRPr lang="en-GB"/>
           </a:p>
@@ -5067,7 +5068,7 @@
             <a:fld id="{5913FB77-D8DB-4AB9-8EA5-EE8C3B57A5E1}" type="datetimeFigureOut">
               <a:rPr lang="en-GB" smtClean="0"/>
               <a:pPr/>
-              <a:t>16/02/2022</a:t>
+              <a:t>17/01/2023</a:t>
             </a:fld>
             <a:endParaRPr lang="en-GB"/>
           </a:p>
@@ -5565,92 +5566,6 @@
           </a:p>
         </p:txBody>
       </p:sp>
-      <p:sp>
-        <p:nvSpPr>
-          <p:cNvPr id="6" name="TextBox 5">
-            <a:extLst>
-              <a:ext uri="{FF2B5EF4-FFF2-40B4-BE49-F238E27FC236}">
-                <a16:creationId xmlns:a16="http://schemas.microsoft.com/office/drawing/2014/main" id="{13378ABE-306C-4249-AB66-3794C39C4292}"/>
-              </a:ext>
-            </a:extLst>
-          </p:cNvPr>
-          <p:cNvSpPr txBox="1"/>
-          <p:nvPr/>
-        </p:nvSpPr>
-        <p:spPr>
-          <a:xfrm>
-            <a:off x="1357979" y="5896725"/>
-            <a:ext cx="6987331" cy="369332"/>
-          </a:xfrm>
-          <a:prstGeom prst="rect">
-            <a:avLst/>
-          </a:prstGeom>
-          <a:noFill/>
-        </p:spPr>
-        <p:txBody>
-          <a:bodyPr wrap="square">
-            <a:spAutoFit/>
-          </a:bodyPr>
-          <a:lstStyle/>
-          <a:p>
-            <a:r>
-              <a:rPr lang="en-GB" dirty="0"/>
-              <a:t>Open https://pad.carpentries.org/2022-02-16-ed-dash-fair</a:t>
-            </a:r>
-            <a:endParaRPr lang="en-GB" dirty="0">
-              <a:highlight>
-                <a:srgbClr val="FFFF00"/>
-              </a:highlight>
-            </a:endParaRPr>
-          </a:p>
-        </p:txBody>
-      </p:sp>
-      <p:sp>
-        <p:nvSpPr>
-          <p:cNvPr id="9" name="Arrow: Down 7">
-            <a:extLst>
-              <a:ext uri="{FF2B5EF4-FFF2-40B4-BE49-F238E27FC236}">
-                <a16:creationId xmlns:a16="http://schemas.microsoft.com/office/drawing/2014/main" id="{6E790B91-4466-574C-8CA2-C9A23BAC8CA7}"/>
-              </a:ext>
-            </a:extLst>
-          </p:cNvPr>
-          <p:cNvSpPr/>
-          <p:nvPr/>
-        </p:nvSpPr>
-        <p:spPr>
-          <a:xfrm rot="16200000">
-            <a:off x="676214" y="5770998"/>
-            <a:ext cx="469783" cy="620786"/>
-          </a:xfrm>
-          <a:prstGeom prst="downArrow">
-            <a:avLst/>
-          </a:prstGeom>
-        </p:spPr>
-        <p:style>
-          <a:lnRef idx="2">
-            <a:schemeClr val="accent1">
-              <a:shade val="50000"/>
-            </a:schemeClr>
-          </a:lnRef>
-          <a:fillRef idx="1">
-            <a:schemeClr val="accent1"/>
-          </a:fillRef>
-          <a:effectRef idx="0">
-            <a:schemeClr val="accent1"/>
-          </a:effectRef>
-          <a:fontRef idx="minor">
-            <a:schemeClr val="lt1"/>
-          </a:fontRef>
-        </p:style>
-        <p:txBody>
-          <a:bodyPr rtlCol="0" anchor="ctr"/>
-          <a:lstStyle/>
-          <a:p>
-            <a:pPr algn="ctr"/>
-            <a:endParaRPr lang="en-GB"/>
-          </a:p>
-        </p:txBody>
-      </p:sp>
     </p:spTree>
     <p:extLst>
       <p:ext uri="{BB962C8B-B14F-4D97-AF65-F5344CB8AC3E}">
@@ -6251,6 +6166,14 @@
               </a:rPr>
               <a:t> special characters </a:t>
             </a:r>
+            <a:r>
+              <a:rPr lang="pl-PL" sz="2800" dirty="0">
+                <a:solidFill>
+                  <a:srgbClr val="0070C0"/>
+                </a:solidFill>
+              </a:rPr>
+              <a:t/>
+            </a:r>
             <a:br>
               <a:rPr lang="pl-PL" sz="2800" dirty="0">
                 <a:solidFill>
@@ -6549,6 +6472,14 @@
               </a:rPr>
               <a:t>elements</a:t>
             </a:r>
+            <a:r>
+              <a:rPr lang="pl-PL" sz="2800" dirty="0">
+                <a:solidFill>
+                  <a:srgbClr val="0070C0"/>
+                </a:solidFill>
+              </a:rPr>
+              <a:t/>
+            </a:r>
             <a:br>
               <a:rPr lang="pl-PL" sz="2800" dirty="0">
                 <a:solidFill>
@@ -6646,6 +6577,14 @@
               </a:rPr>
               <a:t> deep paths with long names </a:t>
             </a:r>
+            <a:r>
+              <a:rPr lang="pl-PL" sz="2800" dirty="0">
+                <a:solidFill>
+                  <a:srgbClr val="0070C0"/>
+                </a:solidFill>
+              </a:rPr>
+              <a:t/>
+            </a:r>
             <a:br>
               <a:rPr lang="pl-PL" sz="2800" dirty="0">
                 <a:solidFill>
@@ -6660,6 +6599,14 @@
                 </a:solidFill>
               </a:rPr>
               <a:t>(i.e. deeply nested folders with long names) </a:t>
+            </a:r>
+            <a:r>
+              <a:rPr lang="pl-PL" sz="2800" dirty="0">
+                <a:solidFill>
+                  <a:srgbClr val="0070C0"/>
+                </a:solidFill>
+              </a:rPr>
+              <a:t/>
             </a:r>
             <a:br>
               <a:rPr lang="pl-PL" sz="2800" dirty="0">
@@ -7939,6 +7886,14 @@
             </a:r>
           </a:p>
           <a:p>
+            <a:r>
+              <a:rPr lang="en-GB" sz="2800" dirty="0">
+                <a:solidFill>
+                  <a:srgbClr val="0070C0"/>
+                </a:solidFill>
+              </a:rPr>
+              <a:t/>
+            </a:r>
             <a:br>
               <a:rPr lang="en-GB" sz="2800" dirty="0">
                 <a:solidFill>
@@ -8703,6 +8658,14 @@
               </a:rPr>
               <a:t>If you change the strategy document it in PROJECT_STRUCTURE </a:t>
             </a:r>
+            <a:r>
+              <a:rPr lang="pl-PL" sz="2800" dirty="0">
+                <a:solidFill>
+                  <a:srgbClr val="0070C0"/>
+                </a:solidFill>
+              </a:rPr>
+              <a:t/>
+            </a:r>
             <a:br>
               <a:rPr lang="pl-PL" sz="2800" dirty="0">
                 <a:solidFill>
@@ -8973,7 +8936,7 @@
         <p:spPr>
           <a:xfrm>
             <a:off x="1508922" y="1524088"/>
-            <a:ext cx="9174155" cy="3690241"/>
+            <a:ext cx="9174155" cy="920252"/>
           </a:xfrm>
           <a:prstGeom prst="rect">
             <a:avLst/>
@@ -8992,28 +8955,18 @@
               </a:lnSpc>
             </a:pPr>
             <a:r>
-              <a:rPr lang="en-GB" sz="4000" dirty="0">
-                <a:solidFill>
-                  <a:srgbClr val="0070C0"/>
-                </a:solidFill>
-              </a:rPr>
-              <a:t>In groups, discuss:</a:t>
-            </a:r>
-          </a:p>
-          <a:p>
-            <a:pPr>
-              <a:lnSpc>
-                <a:spcPct val="150000"/>
-              </a:lnSpc>
-            </a:pPr>
-            <a:r>
-              <a:rPr lang="en-GB" sz="4000" dirty="0">
-                <a:solidFill>
-                  <a:srgbClr val="0070C0"/>
-                </a:solidFill>
-              </a:rPr>
-              <a:t>How can a strategy for folder organisation and naming convention help in achieving FAIR data?</a:t>
-            </a:r>
+              <a:rPr lang="pl-PL" sz="4000" dirty="0" smtClean="0">
+                <a:solidFill>
+                  <a:srgbClr val="0070C0"/>
+                </a:solidFill>
+              </a:rPr>
+              <a:t>Exercise benefits of good files managment</a:t>
+            </a:r>
+            <a:endParaRPr lang="en-GB" sz="4000" dirty="0">
+              <a:solidFill>
+                <a:srgbClr val="0070C0"/>
+              </a:solidFill>
+            </a:endParaRPr>
           </a:p>
         </p:txBody>
       </p:sp>
@@ -9021,6 +8974,273 @@
     <p:extLst>
       <p:ext uri="{BB962C8B-B14F-4D97-AF65-F5344CB8AC3E}">
         <p14:creationId xmlns:p14="http://schemas.microsoft.com/office/powerpoint/2010/main" val="3747721469"/>
+      </p:ext>
+    </p:extLst>
+  </p:cSld>
+  <p:clrMapOvr>
+    <a:masterClrMapping/>
+  </p:clrMapOvr>
+</p:sld>
+</file>
+
+<file path=ppt/slides/slide26.xml><?xml version="1.0" encoding="utf-8"?>
+<p:sld xmlns:a="http://schemas.openxmlformats.org/drawingml/2006/main" xmlns:r="http://schemas.openxmlformats.org/officeDocument/2006/relationships" xmlns:p="http://schemas.openxmlformats.org/presentationml/2006/main">
+  <p:cSld>
+    <p:spTree>
+      <p:nvGrpSpPr>
+        <p:cNvPr id="1" name=""/>
+        <p:cNvGrpSpPr/>
+        <p:nvPr/>
+      </p:nvGrpSpPr>
+      <p:grpSpPr>
+        <a:xfrm>
+          <a:off x="0" y="0"/>
+          <a:ext cx="0" cy="0"/>
+          <a:chOff x="0" y="0"/>
+          <a:chExt cx="0" cy="0"/>
+        </a:xfrm>
+      </p:grpSpPr>
+      <p:sp>
+        <p:nvSpPr>
+          <p:cNvPr id="5" name="TextBox 4">
+            <a:extLst>
+              <a:ext uri="{FF2B5EF4-FFF2-40B4-BE49-F238E27FC236}">
+                <a16:creationId xmlns:a16="http://schemas.microsoft.com/office/drawing/2014/main" id="{3A7A1F5C-9C70-4DE3-BA39-7835B2935EB3}"/>
+              </a:ext>
+            </a:extLst>
+          </p:cNvPr>
+          <p:cNvSpPr txBox="1"/>
+          <p:nvPr/>
+        </p:nvSpPr>
+        <p:spPr>
+          <a:xfrm>
+            <a:off x="1363735" y="1568376"/>
+            <a:ext cx="9464530" cy="2677656"/>
+          </a:xfrm>
+          <a:prstGeom prst="rect">
+            <a:avLst/>
+          </a:prstGeom>
+          <a:noFill/>
+        </p:spPr>
+        <p:txBody>
+          <a:bodyPr wrap="square">
+            <a:spAutoFit/>
+          </a:bodyPr>
+          <a:lstStyle/>
+          <a:p>
+            <a:pPr marL="457200" indent="-457200">
+              <a:buFont typeface="Arial" panose="020B0604020202020204" pitchFamily="34" charset="0"/>
+              <a:buChar char="•"/>
+            </a:pPr>
+            <a:r>
+              <a:rPr lang="en-GB" sz="2800" dirty="0" smtClean="0">
+                <a:solidFill>
+                  <a:srgbClr val="0070C0"/>
+                </a:solidFill>
+              </a:rPr>
+              <a:t>A </a:t>
+            </a:r>
+            <a:r>
+              <a:rPr lang="en-GB" sz="2800" dirty="0">
+                <a:solidFill>
+                  <a:srgbClr val="0070C0"/>
+                </a:solidFill>
+              </a:rPr>
+              <a:t>good file name suggests the file </a:t>
+            </a:r>
+            <a:r>
+              <a:rPr lang="en-GB" sz="2800" dirty="0" smtClean="0">
+                <a:solidFill>
+                  <a:srgbClr val="0070C0"/>
+                </a:solidFill>
+              </a:rPr>
+              <a:t>content</a:t>
+            </a:r>
+            <a:endParaRPr lang="pl-PL" sz="2800" dirty="0" smtClean="0">
+              <a:solidFill>
+                <a:srgbClr val="0070C0"/>
+              </a:solidFill>
+            </a:endParaRPr>
+          </a:p>
+          <a:p>
+            <a:pPr marL="457200" indent="-457200">
+              <a:buFont typeface="Arial" panose="020B0604020202020204" pitchFamily="34" charset="0"/>
+              <a:buChar char="•"/>
+            </a:pPr>
+            <a:endParaRPr lang="en-GB" sz="2800" dirty="0">
+              <a:solidFill>
+                <a:srgbClr val="0070C0"/>
+              </a:solidFill>
+            </a:endParaRPr>
+          </a:p>
+          <a:p>
+            <a:pPr marL="457200" indent="-457200">
+              <a:buFont typeface="Arial" panose="020B0604020202020204" pitchFamily="34" charset="0"/>
+              <a:buChar char="•"/>
+            </a:pPr>
+            <a:r>
+              <a:rPr lang="en-GB" sz="2800" dirty="0" smtClean="0">
+                <a:solidFill>
+                  <a:srgbClr val="0070C0"/>
+                </a:solidFill>
+              </a:rPr>
+              <a:t>Good </a:t>
+            </a:r>
+            <a:r>
+              <a:rPr lang="en-GB" sz="2800" dirty="0">
+                <a:solidFill>
+                  <a:srgbClr val="0070C0"/>
+                </a:solidFill>
+              </a:rPr>
+              <a:t>project organization saves you </a:t>
+            </a:r>
+            <a:r>
+              <a:rPr lang="en-GB" sz="2800" dirty="0" smtClean="0">
+                <a:solidFill>
+                  <a:srgbClr val="0070C0"/>
+                </a:solidFill>
+              </a:rPr>
+              <a:t>time</a:t>
+            </a:r>
+            <a:endParaRPr lang="pl-PL" sz="2800" dirty="0" smtClean="0">
+              <a:solidFill>
+                <a:srgbClr val="0070C0"/>
+              </a:solidFill>
+            </a:endParaRPr>
+          </a:p>
+          <a:p>
+            <a:pPr marL="457200" indent="-457200">
+              <a:buFont typeface="Arial" panose="020B0604020202020204" pitchFamily="34" charset="0"/>
+              <a:buChar char="•"/>
+            </a:pPr>
+            <a:endParaRPr lang="en-GB" sz="2800" dirty="0">
+              <a:solidFill>
+                <a:srgbClr val="0070C0"/>
+              </a:solidFill>
+            </a:endParaRPr>
+          </a:p>
+          <a:p>
+            <a:pPr marL="457200" indent="-457200">
+              <a:buFont typeface="Arial" panose="020B0604020202020204" pitchFamily="34" charset="0"/>
+              <a:buChar char="•"/>
+            </a:pPr>
+            <a:r>
+              <a:rPr lang="en-GB" sz="2800" dirty="0" smtClean="0">
+                <a:solidFill>
+                  <a:srgbClr val="0070C0"/>
+                </a:solidFill>
+              </a:rPr>
+              <a:t>Describe </a:t>
+            </a:r>
+            <a:r>
+              <a:rPr lang="en-GB" sz="2800" dirty="0">
+                <a:solidFill>
+                  <a:srgbClr val="0070C0"/>
+                </a:solidFill>
+              </a:rPr>
+              <a:t>your files organization in PROJECT_STRUCTURE or README including naming </a:t>
+            </a:r>
+            <a:r>
+              <a:rPr lang="en-GB" sz="2800" dirty="0" smtClean="0">
+                <a:solidFill>
+                  <a:srgbClr val="0070C0"/>
+                </a:solidFill>
+              </a:rPr>
+              <a:t>convention</a:t>
+            </a:r>
+            <a:endParaRPr lang="en-GB" sz="2800" dirty="0">
+              <a:solidFill>
+                <a:srgbClr val="0070C0"/>
+              </a:solidFill>
+            </a:endParaRPr>
+          </a:p>
+        </p:txBody>
+      </p:sp>
+      <p:pic>
+        <p:nvPicPr>
+          <p:cNvPr id="4" name="Picture 2" descr="Ed_DaSH">
+            <a:extLst>
+              <a:ext uri="{FF2B5EF4-FFF2-40B4-BE49-F238E27FC236}">
+                <a16:creationId xmlns:a16="http://schemas.microsoft.com/office/drawing/2014/main" id="{A783256F-E39E-4712-96B0-240BD611CFEB}"/>
+              </a:ext>
+            </a:extLst>
+          </p:cNvPr>
+          <p:cNvPicPr>
+            <a:picLocks noChangeAspect="1" noChangeArrowheads="1"/>
+          </p:cNvPicPr>
+          <p:nvPr/>
+        </p:nvPicPr>
+        <p:blipFill>
+          <a:blip r:embed="rId2" cstate="hqprint">
+            <a:extLst>
+              <a:ext uri="{28A0092B-C50C-407E-A947-70E740481C1C}">
+                <a14:useLocalDpi xmlns:a14="http://schemas.microsoft.com/office/drawing/2010/main" val="0"/>
+              </a:ext>
+            </a:extLst>
+          </a:blip>
+          <a:srcRect/>
+          <a:stretch>
+            <a:fillRect/>
+          </a:stretch>
+        </p:blipFill>
+        <p:spPr bwMode="auto">
+          <a:xfrm>
+            <a:off x="10820670" y="5458691"/>
+            <a:ext cx="1289214" cy="1325418"/>
+          </a:xfrm>
+          <a:prstGeom prst="rect">
+            <a:avLst/>
+          </a:prstGeom>
+          <a:noFill/>
+          <a:extLst>
+            <a:ext uri="{909E8E84-426E-40DD-AFC4-6F175D3DCCD1}">
+              <a14:hiddenFill xmlns:a14="http://schemas.microsoft.com/office/drawing/2010/main">
+                <a:solidFill>
+                  <a:srgbClr val="FFFFFF"/>
+                </a:solidFill>
+              </a14:hiddenFill>
+            </a:ext>
+          </a:extLst>
+        </p:spPr>
+      </p:pic>
+      <p:sp>
+        <p:nvSpPr>
+          <p:cNvPr id="6" name="Title 1">
+            <a:extLst>
+              <a:ext uri="{FF2B5EF4-FFF2-40B4-BE49-F238E27FC236}">
+                <a16:creationId xmlns:a16="http://schemas.microsoft.com/office/drawing/2014/main" id="{2DAB931A-8376-F04C-8C71-131A697E2222}"/>
+              </a:ext>
+            </a:extLst>
+          </p:cNvPr>
+          <p:cNvSpPr>
+            <a:spLocks noGrp="1"/>
+          </p:cNvSpPr>
+          <p:nvPr>
+            <p:ph type="title"/>
+          </p:nvPr>
+        </p:nvSpPr>
+        <p:spPr>
+          <a:xfrm>
+            <a:off x="838200" y="365125"/>
+            <a:ext cx="10515600" cy="1325563"/>
+          </a:xfrm>
+        </p:spPr>
+        <p:txBody>
+          <a:bodyPr/>
+          <a:lstStyle/>
+          <a:p>
+            <a:r>
+              <a:rPr lang="pl-PL" dirty="0" smtClean="0"/>
+              <a:t>Key points</a:t>
+            </a:r>
+            <a:endParaRPr lang="en-GB" dirty="0"/>
+          </a:p>
+        </p:txBody>
+      </p:sp>
+    </p:spTree>
+    <p:extLst>
+      <p:ext uri="{BB962C8B-B14F-4D97-AF65-F5344CB8AC3E}">
+        <p14:creationId xmlns:p14="http://schemas.microsoft.com/office/powerpoint/2010/main" val="2327028274"/>
       </p:ext>
     </p:extLst>
   </p:cSld>
@@ -9080,20 +9300,20 @@
               <a:buChar char="•"/>
             </a:pPr>
             <a:r>
-              <a:rPr lang="pl-PL" sz="2800" dirty="0">
-                <a:solidFill>
-                  <a:srgbClr val="0070C0"/>
-                </a:solidFill>
-              </a:rPr>
-              <a:t>F</a:t>
-            </a:r>
-            <a:r>
-              <a:rPr lang="en-GB" sz="2800" dirty="0" err="1">
-                <a:solidFill>
-                  <a:srgbClr val="0070C0"/>
-                </a:solidFill>
-              </a:rPr>
-              <a:t>ind</a:t>
+              <a:rPr lang="pl-PL" sz="2800" dirty="0" smtClean="0">
+                <a:solidFill>
+                  <a:srgbClr val="0070C0"/>
+                </a:solidFill>
+              </a:rPr>
+              <a:t>Find</a:t>
+            </a:r>
+            <a:r>
+              <a:rPr lang="en-GB" sz="2800" dirty="0" smtClean="0">
+                <a:solidFill>
+                  <a:srgbClr val="0070C0"/>
+                </a:solidFill>
+              </a:rPr>
+              <a:t> </a:t>
             </a:r>
             <a:r>
               <a:rPr lang="en-GB" sz="2800" dirty="0">
@@ -9101,7 +9321,7 @@
                   <a:srgbClr val="0070C0"/>
                 </a:solidFill>
               </a:rPr>
-              <a:t> files</a:t>
+              <a:t>files</a:t>
             </a:r>
             <a:r>
               <a:rPr lang="pl-PL" sz="2800" dirty="0">
@@ -10237,6 +10457,14 @@
                 </a:solidFill>
               </a:rPr>
             </a:br>
+            <a:r>
+              <a:rPr lang="pl-PL" sz="2800" dirty="0">
+                <a:solidFill>
+                  <a:srgbClr val="0070C0"/>
+                </a:solidFill>
+              </a:rPr>
+              <a:t/>
+            </a:r>
             <a:br>
               <a:rPr lang="pl-PL" sz="2800" dirty="0">
                 <a:solidFill>
@@ -10267,6 +10495,14 @@
                 </a:solidFill>
               </a:rPr>
             </a:br>
+            <a:r>
+              <a:rPr lang="pl-PL" sz="2400" dirty="0">
+                <a:solidFill>
+                  <a:srgbClr val="0070C0"/>
+                </a:solidFill>
+              </a:rPr>
+              <a:t/>
+            </a:r>
             <a:br>
               <a:rPr lang="pl-PL" sz="2400" dirty="0">
                 <a:solidFill>
@@ -10335,6 +10571,14 @@
                 </a:solidFill>
               </a:rPr>
             </a:br>
+            <a:r>
+              <a:rPr lang="pl-PL" sz="2800" dirty="0">
+                <a:solidFill>
+                  <a:srgbClr val="0070C0"/>
+                </a:solidFill>
+              </a:rPr>
+              <a:t/>
+            </a:r>
             <a:br>
               <a:rPr lang="pl-PL" sz="2800" dirty="0">
                 <a:solidFill>
@@ -10647,6 +10891,14 @@
                 </a:solidFill>
               </a:rPr>
             </a:br>
+            <a:r>
+              <a:rPr lang="pl-PL" sz="2800" dirty="0">
+                <a:solidFill>
+                  <a:srgbClr val="0070C0"/>
+                </a:solidFill>
+              </a:rPr>
+              <a:t/>
+            </a:r>
             <a:br>
               <a:rPr lang="pl-PL" sz="2800" dirty="0">
                 <a:solidFill>

</xml_diff>